<commit_message>
Adding demo and Installation folder and DCN lectures
</commit_message>
<xml_diff>
--- a/UCSD_OpenCV_Lecture Three.pptx
+++ b/UCSD_OpenCV_Lecture Three.pptx
@@ -5,7 +5,7 @@
     <p:sldMasterId id="2147483648" r:id="rId1"/>
   </p:sldMasterIdLst>
   <p:notesMasterIdLst>
-    <p:notesMasterId r:id="rId12"/>
+    <p:notesMasterId r:id="rId20"/>
   </p:notesMasterIdLst>
   <p:sldIdLst>
     <p:sldId id="259" r:id="rId2"/>
@@ -16,8 +16,16 @@
     <p:sldId id="265" r:id="rId7"/>
     <p:sldId id="266" r:id="rId8"/>
     <p:sldId id="267" r:id="rId9"/>
-    <p:sldId id="268" r:id="rId10"/>
-    <p:sldId id="269" r:id="rId11"/>
+    <p:sldId id="270" r:id="rId10"/>
+    <p:sldId id="271" r:id="rId11"/>
+    <p:sldId id="272" r:id="rId12"/>
+    <p:sldId id="273" r:id="rId13"/>
+    <p:sldId id="274" r:id="rId14"/>
+    <p:sldId id="275" r:id="rId15"/>
+    <p:sldId id="276" r:id="rId16"/>
+    <p:sldId id="277" r:id="rId17"/>
+    <p:sldId id="268" r:id="rId18"/>
+    <p:sldId id="269" r:id="rId19"/>
   </p:sldIdLst>
   <p:sldSz cx="12192000" cy="6858000"/>
   <p:notesSz cx="6858000" cy="9144000"/>
@@ -206,7 +214,7 @@
           <a:p>
             <a:fld id="{AA15E090-B3FD-4D6F-9468-084C6FF658EE}" type="datetimeFigureOut">
               <a:rPr lang="en-US" smtClean="0"/>
-              <a:t>8/11/2015</a:t>
+              <a:t>8/21/2015</a:t>
             </a:fld>
             <a:endParaRPr lang="en-US"/>
           </a:p>
@@ -605,7 +613,7 @@
           <a:p>
             <a:fld id="{D86FD9A5-42BF-4FB8-B122-8045CBA0BEC2}" type="datetimeFigureOut">
               <a:rPr lang="en-US" smtClean="0"/>
-              <a:t>8/11/2015</a:t>
+              <a:t>8/21/2015</a:t>
             </a:fld>
             <a:endParaRPr lang="en-US"/>
           </a:p>
@@ -775,7 +783,7 @@
           <a:p>
             <a:fld id="{D86FD9A5-42BF-4FB8-B122-8045CBA0BEC2}" type="datetimeFigureOut">
               <a:rPr lang="en-US" smtClean="0"/>
-              <a:t>8/11/2015</a:t>
+              <a:t>8/21/2015</a:t>
             </a:fld>
             <a:endParaRPr lang="en-US"/>
           </a:p>
@@ -955,7 +963,7 @@
           <a:p>
             <a:fld id="{D86FD9A5-42BF-4FB8-B122-8045CBA0BEC2}" type="datetimeFigureOut">
               <a:rPr lang="en-US" smtClean="0"/>
-              <a:t>8/11/2015</a:t>
+              <a:t>8/21/2015</a:t>
             </a:fld>
             <a:endParaRPr lang="en-US"/>
           </a:p>
@@ -1125,7 +1133,7 @@
           <a:p>
             <a:fld id="{D86FD9A5-42BF-4FB8-B122-8045CBA0BEC2}" type="datetimeFigureOut">
               <a:rPr lang="en-US" smtClean="0"/>
-              <a:t>8/11/2015</a:t>
+              <a:t>8/21/2015</a:t>
             </a:fld>
             <a:endParaRPr lang="en-US"/>
           </a:p>
@@ -1371,7 +1379,7 @@
           <a:p>
             <a:fld id="{D86FD9A5-42BF-4FB8-B122-8045CBA0BEC2}" type="datetimeFigureOut">
               <a:rPr lang="en-US" smtClean="0"/>
-              <a:t>8/11/2015</a:t>
+              <a:t>8/21/2015</a:t>
             </a:fld>
             <a:endParaRPr lang="en-US"/>
           </a:p>
@@ -1603,7 +1611,7 @@
           <a:p>
             <a:fld id="{D86FD9A5-42BF-4FB8-B122-8045CBA0BEC2}" type="datetimeFigureOut">
               <a:rPr lang="en-US" smtClean="0"/>
-              <a:t>8/11/2015</a:t>
+              <a:t>8/21/2015</a:t>
             </a:fld>
             <a:endParaRPr lang="en-US"/>
           </a:p>
@@ -1970,7 +1978,7 @@
           <a:p>
             <a:fld id="{D86FD9A5-42BF-4FB8-B122-8045CBA0BEC2}" type="datetimeFigureOut">
               <a:rPr lang="en-US" smtClean="0"/>
-              <a:t>8/11/2015</a:t>
+              <a:t>8/21/2015</a:t>
             </a:fld>
             <a:endParaRPr lang="en-US"/>
           </a:p>
@@ -2088,7 +2096,7 @@
           <a:p>
             <a:fld id="{D86FD9A5-42BF-4FB8-B122-8045CBA0BEC2}" type="datetimeFigureOut">
               <a:rPr lang="en-US" smtClean="0"/>
-              <a:t>8/11/2015</a:t>
+              <a:t>8/21/2015</a:t>
             </a:fld>
             <a:endParaRPr lang="en-US"/>
           </a:p>
@@ -2183,7 +2191,7 @@
           <a:p>
             <a:fld id="{D86FD9A5-42BF-4FB8-B122-8045CBA0BEC2}" type="datetimeFigureOut">
               <a:rPr lang="en-US" smtClean="0"/>
-              <a:t>8/11/2015</a:t>
+              <a:t>8/21/2015</a:t>
             </a:fld>
             <a:endParaRPr lang="en-US"/>
           </a:p>
@@ -2460,7 +2468,7 @@
           <a:p>
             <a:fld id="{D86FD9A5-42BF-4FB8-B122-8045CBA0BEC2}" type="datetimeFigureOut">
               <a:rPr lang="en-US" smtClean="0"/>
-              <a:t>8/11/2015</a:t>
+              <a:t>8/21/2015</a:t>
             </a:fld>
             <a:endParaRPr lang="en-US"/>
           </a:p>
@@ -2713,7 +2721,7 @@
           <a:p>
             <a:fld id="{D86FD9A5-42BF-4FB8-B122-8045CBA0BEC2}" type="datetimeFigureOut">
               <a:rPr lang="en-US" smtClean="0"/>
-              <a:t>8/11/2015</a:t>
+              <a:t>8/21/2015</a:t>
             </a:fld>
             <a:endParaRPr lang="en-US"/>
           </a:p>
@@ -2926,7 +2934,7 @@
           <a:p>
             <a:fld id="{D86FD9A5-42BF-4FB8-B122-8045CBA0BEC2}" type="datetimeFigureOut">
               <a:rPr lang="en-US" smtClean="0"/>
-              <a:t>8/11/2015</a:t>
+              <a:t>8/21/2015</a:t>
             </a:fld>
             <a:endParaRPr lang="en-US"/>
           </a:p>
@@ -3417,6 +3425,532 @@
           <a:chExt cx="0" cy="0"/>
         </a:xfrm>
       </p:grpSpPr>
+      <p:pic>
+        <p:nvPicPr>
+          <p:cNvPr id="3" name="Picture 2"/>
+          <p:cNvPicPr>
+            <a:picLocks noChangeAspect="1"/>
+          </p:cNvPicPr>
+          <p:nvPr/>
+        </p:nvPicPr>
+        <p:blipFill>
+          <a:blip r:embed="rId2"/>
+          <a:stretch>
+            <a:fillRect/>
+          </a:stretch>
+        </p:blipFill>
+        <p:spPr>
+          <a:xfrm>
+            <a:off x="597600" y="500898"/>
+            <a:ext cx="10710362" cy="5724001"/>
+          </a:xfrm>
+          <a:prstGeom prst="rect">
+            <a:avLst/>
+          </a:prstGeom>
+        </p:spPr>
+      </p:pic>
+    </p:spTree>
+    <p:extLst>
+      <p:ext uri="{BB962C8B-B14F-4D97-AF65-F5344CB8AC3E}">
+        <p14:creationId xmlns:p14="http://schemas.microsoft.com/office/powerpoint/2010/main" val="2713006808"/>
+      </p:ext>
+    </p:extLst>
+  </p:cSld>
+  <p:clrMapOvr>
+    <a:masterClrMapping/>
+  </p:clrMapOvr>
+</p:sld>
+</file>
+
+<file path=ppt/slides/slide11.xml><?xml version="1.0" encoding="utf-8"?>
+<p:sld xmlns:a="http://schemas.openxmlformats.org/drawingml/2006/main" xmlns:r="http://schemas.openxmlformats.org/officeDocument/2006/relationships" xmlns:p="http://schemas.openxmlformats.org/presentationml/2006/main">
+  <p:cSld>
+    <p:spTree>
+      <p:nvGrpSpPr>
+        <p:cNvPr id="1" name=""/>
+        <p:cNvGrpSpPr/>
+        <p:nvPr/>
+      </p:nvGrpSpPr>
+      <p:grpSpPr>
+        <a:xfrm>
+          <a:off x="0" y="0"/>
+          <a:ext cx="0" cy="0"/>
+          <a:chOff x="0" y="0"/>
+          <a:chExt cx="0" cy="0"/>
+        </a:xfrm>
+      </p:grpSpPr>
+      <p:pic>
+        <p:nvPicPr>
+          <p:cNvPr id="2" name="Picture 1"/>
+          <p:cNvPicPr>
+            <a:picLocks noChangeAspect="1"/>
+          </p:cNvPicPr>
+          <p:nvPr/>
+        </p:nvPicPr>
+        <p:blipFill>
+          <a:blip r:embed="rId2"/>
+          <a:stretch>
+            <a:fillRect/>
+          </a:stretch>
+        </p:blipFill>
+        <p:spPr>
+          <a:xfrm>
+            <a:off x="1142574" y="528810"/>
+            <a:ext cx="9796682" cy="5695721"/>
+          </a:xfrm>
+          <a:prstGeom prst="rect">
+            <a:avLst/>
+          </a:prstGeom>
+        </p:spPr>
+      </p:pic>
+    </p:spTree>
+    <p:extLst>
+      <p:ext uri="{BB962C8B-B14F-4D97-AF65-F5344CB8AC3E}">
+        <p14:creationId xmlns:p14="http://schemas.microsoft.com/office/powerpoint/2010/main" val="3525575149"/>
+      </p:ext>
+    </p:extLst>
+  </p:cSld>
+  <p:clrMapOvr>
+    <a:masterClrMapping/>
+  </p:clrMapOvr>
+</p:sld>
+</file>
+
+<file path=ppt/slides/slide12.xml><?xml version="1.0" encoding="utf-8"?>
+<p:sld xmlns:a="http://schemas.openxmlformats.org/drawingml/2006/main" xmlns:r="http://schemas.openxmlformats.org/officeDocument/2006/relationships" xmlns:p="http://schemas.openxmlformats.org/presentationml/2006/main">
+  <p:cSld>
+    <p:spTree>
+      <p:nvGrpSpPr>
+        <p:cNvPr id="1" name=""/>
+        <p:cNvGrpSpPr/>
+        <p:nvPr/>
+      </p:nvGrpSpPr>
+      <p:grpSpPr>
+        <a:xfrm>
+          <a:off x="0" y="0"/>
+          <a:ext cx="0" cy="0"/>
+          <a:chOff x="0" y="0"/>
+          <a:chExt cx="0" cy="0"/>
+        </a:xfrm>
+      </p:grpSpPr>
+      <p:pic>
+        <p:nvPicPr>
+          <p:cNvPr id="2" name="Picture 1"/>
+          <p:cNvPicPr>
+            <a:picLocks noChangeAspect="1"/>
+          </p:cNvPicPr>
+          <p:nvPr/>
+        </p:nvPicPr>
+        <p:blipFill>
+          <a:blip r:embed="rId2"/>
+          <a:stretch>
+            <a:fillRect/>
+          </a:stretch>
+        </p:blipFill>
+        <p:spPr>
+          <a:xfrm>
+            <a:off x="1375319" y="45479"/>
+            <a:ext cx="9441362" cy="6767041"/>
+          </a:xfrm>
+          <a:prstGeom prst="rect">
+            <a:avLst/>
+          </a:prstGeom>
+        </p:spPr>
+      </p:pic>
+    </p:spTree>
+    <p:extLst>
+      <p:ext uri="{BB962C8B-B14F-4D97-AF65-F5344CB8AC3E}">
+        <p14:creationId xmlns:p14="http://schemas.microsoft.com/office/powerpoint/2010/main" val="1222089950"/>
+      </p:ext>
+    </p:extLst>
+  </p:cSld>
+  <p:clrMapOvr>
+    <a:masterClrMapping/>
+  </p:clrMapOvr>
+</p:sld>
+</file>
+
+<file path=ppt/slides/slide13.xml><?xml version="1.0" encoding="utf-8"?>
+<p:sld xmlns:a="http://schemas.openxmlformats.org/drawingml/2006/main" xmlns:r="http://schemas.openxmlformats.org/officeDocument/2006/relationships" xmlns:p="http://schemas.openxmlformats.org/presentationml/2006/main">
+  <p:cSld>
+    <p:spTree>
+      <p:nvGrpSpPr>
+        <p:cNvPr id="1" name=""/>
+        <p:cNvGrpSpPr/>
+        <p:nvPr/>
+      </p:nvGrpSpPr>
+      <p:grpSpPr>
+        <a:xfrm>
+          <a:off x="0" y="0"/>
+          <a:ext cx="0" cy="0"/>
+          <a:chOff x="0" y="0"/>
+          <a:chExt cx="0" cy="0"/>
+        </a:xfrm>
+      </p:grpSpPr>
+      <p:pic>
+        <p:nvPicPr>
+          <p:cNvPr id="2" name="Picture 1"/>
+          <p:cNvPicPr>
+            <a:picLocks noChangeAspect="1"/>
+          </p:cNvPicPr>
+          <p:nvPr/>
+        </p:nvPicPr>
+        <p:blipFill>
+          <a:blip r:embed="rId2"/>
+          <a:stretch>
+            <a:fillRect/>
+          </a:stretch>
+        </p:blipFill>
+        <p:spPr>
+          <a:xfrm>
+            <a:off x="1324559" y="-43561"/>
+            <a:ext cx="9542882" cy="6945121"/>
+          </a:xfrm>
+          <a:prstGeom prst="rect">
+            <a:avLst/>
+          </a:prstGeom>
+        </p:spPr>
+      </p:pic>
+    </p:spTree>
+    <p:extLst>
+      <p:ext uri="{BB962C8B-B14F-4D97-AF65-F5344CB8AC3E}">
+        <p14:creationId xmlns:p14="http://schemas.microsoft.com/office/powerpoint/2010/main" val="3283364844"/>
+      </p:ext>
+    </p:extLst>
+  </p:cSld>
+  <p:clrMapOvr>
+    <a:masterClrMapping/>
+  </p:clrMapOvr>
+</p:sld>
+</file>
+
+<file path=ppt/slides/slide14.xml><?xml version="1.0" encoding="utf-8"?>
+<p:sld xmlns:a="http://schemas.openxmlformats.org/drawingml/2006/main" xmlns:r="http://schemas.openxmlformats.org/officeDocument/2006/relationships" xmlns:p="http://schemas.openxmlformats.org/presentationml/2006/main">
+  <p:cSld>
+    <p:spTree>
+      <p:nvGrpSpPr>
+        <p:cNvPr id="1" name=""/>
+        <p:cNvGrpSpPr/>
+        <p:nvPr/>
+      </p:nvGrpSpPr>
+      <p:grpSpPr>
+        <a:xfrm>
+          <a:off x="0" y="0"/>
+          <a:ext cx="0" cy="0"/>
+          <a:chOff x="0" y="0"/>
+          <a:chExt cx="0" cy="0"/>
+        </a:xfrm>
+      </p:grpSpPr>
+      <p:pic>
+        <p:nvPicPr>
+          <p:cNvPr id="2" name="Picture 1"/>
+          <p:cNvPicPr>
+            <a:picLocks noChangeAspect="1"/>
+          </p:cNvPicPr>
+          <p:nvPr/>
+        </p:nvPicPr>
+        <p:blipFill>
+          <a:blip r:embed="rId2"/>
+          <a:stretch>
+            <a:fillRect/>
+          </a:stretch>
+        </p:blipFill>
+        <p:spPr>
+          <a:xfrm>
+            <a:off x="1476839" y="20039"/>
+            <a:ext cx="9238322" cy="6817921"/>
+          </a:xfrm>
+          <a:prstGeom prst="rect">
+            <a:avLst/>
+          </a:prstGeom>
+        </p:spPr>
+      </p:pic>
+    </p:spTree>
+    <p:extLst>
+      <p:ext uri="{BB962C8B-B14F-4D97-AF65-F5344CB8AC3E}">
+        <p14:creationId xmlns:p14="http://schemas.microsoft.com/office/powerpoint/2010/main" val="2495563322"/>
+      </p:ext>
+    </p:extLst>
+  </p:cSld>
+  <p:clrMapOvr>
+    <a:masterClrMapping/>
+  </p:clrMapOvr>
+</p:sld>
+</file>
+
+<file path=ppt/slides/slide15.xml><?xml version="1.0" encoding="utf-8"?>
+<p:sld xmlns:a="http://schemas.openxmlformats.org/drawingml/2006/main" xmlns:r="http://schemas.openxmlformats.org/officeDocument/2006/relationships" xmlns:p="http://schemas.openxmlformats.org/presentationml/2006/main">
+  <p:cSld>
+    <p:spTree>
+      <p:nvGrpSpPr>
+        <p:cNvPr id="1" name=""/>
+        <p:cNvGrpSpPr/>
+        <p:nvPr/>
+      </p:nvGrpSpPr>
+      <p:grpSpPr>
+        <a:xfrm>
+          <a:off x="0" y="0"/>
+          <a:ext cx="0" cy="0"/>
+          <a:chOff x="0" y="0"/>
+          <a:chExt cx="0" cy="0"/>
+        </a:xfrm>
+      </p:grpSpPr>
+      <p:pic>
+        <p:nvPicPr>
+          <p:cNvPr id="2" name="Picture 1"/>
+          <p:cNvPicPr>
+            <a:picLocks noChangeAspect="1"/>
+          </p:cNvPicPr>
+          <p:nvPr/>
+        </p:nvPicPr>
+        <p:blipFill>
+          <a:blip r:embed="rId2"/>
+          <a:stretch>
+            <a:fillRect/>
+          </a:stretch>
+        </p:blipFill>
+        <p:spPr>
+          <a:xfrm>
+            <a:off x="1193266" y="320817"/>
+            <a:ext cx="9441362" cy="6182853"/>
+          </a:xfrm>
+          <a:prstGeom prst="rect">
+            <a:avLst/>
+          </a:prstGeom>
+        </p:spPr>
+      </p:pic>
+    </p:spTree>
+    <p:extLst>
+      <p:ext uri="{BB962C8B-B14F-4D97-AF65-F5344CB8AC3E}">
+        <p14:creationId xmlns:p14="http://schemas.microsoft.com/office/powerpoint/2010/main" val="3608458779"/>
+      </p:ext>
+    </p:extLst>
+  </p:cSld>
+  <p:clrMapOvr>
+    <a:masterClrMapping/>
+  </p:clrMapOvr>
+</p:sld>
+</file>
+
+<file path=ppt/slides/slide16.xml><?xml version="1.0" encoding="utf-8"?>
+<p:sld xmlns:a="http://schemas.openxmlformats.org/drawingml/2006/main" xmlns:r="http://schemas.openxmlformats.org/officeDocument/2006/relationships" xmlns:p="http://schemas.openxmlformats.org/presentationml/2006/main">
+  <p:cSld>
+    <p:spTree>
+      <p:nvGrpSpPr>
+        <p:cNvPr id="1" name=""/>
+        <p:cNvGrpSpPr/>
+        <p:nvPr/>
+      </p:nvGrpSpPr>
+      <p:grpSpPr>
+        <a:xfrm>
+          <a:off x="0" y="0"/>
+          <a:ext cx="0" cy="0"/>
+          <a:chOff x="0" y="0"/>
+          <a:chExt cx="0" cy="0"/>
+        </a:xfrm>
+      </p:grpSpPr>
+      <p:pic>
+        <p:nvPicPr>
+          <p:cNvPr id="2" name="Picture 1"/>
+          <p:cNvPicPr>
+            <a:picLocks noChangeAspect="1"/>
+          </p:cNvPicPr>
+          <p:nvPr/>
+        </p:nvPicPr>
+        <p:blipFill>
+          <a:blip r:embed="rId2"/>
+          <a:stretch>
+            <a:fillRect/>
+          </a:stretch>
+        </p:blipFill>
+        <p:spPr>
+          <a:xfrm>
+            <a:off x="816959" y="-24481"/>
+            <a:ext cx="10558082" cy="6906961"/>
+          </a:xfrm>
+          <a:prstGeom prst="rect">
+            <a:avLst/>
+          </a:prstGeom>
+        </p:spPr>
+      </p:pic>
+    </p:spTree>
+    <p:extLst>
+      <p:ext uri="{BB962C8B-B14F-4D97-AF65-F5344CB8AC3E}">
+        <p14:creationId xmlns:p14="http://schemas.microsoft.com/office/powerpoint/2010/main" val="4144308462"/>
+      </p:ext>
+    </p:extLst>
+  </p:cSld>
+  <p:clrMapOvr>
+    <a:masterClrMapping/>
+  </p:clrMapOvr>
+</p:sld>
+</file>
+
+<file path=ppt/slides/slide17.xml><?xml version="1.0" encoding="utf-8"?>
+<p:sld xmlns:a="http://schemas.openxmlformats.org/drawingml/2006/main" xmlns:r="http://schemas.openxmlformats.org/officeDocument/2006/relationships" xmlns:p="http://schemas.openxmlformats.org/presentationml/2006/main">
+  <p:cSld>
+    <p:spTree>
+      <p:nvGrpSpPr>
+        <p:cNvPr id="1" name=""/>
+        <p:cNvGrpSpPr/>
+        <p:nvPr/>
+      </p:nvGrpSpPr>
+      <p:grpSpPr>
+        <a:xfrm>
+          <a:off x="0" y="0"/>
+          <a:ext cx="0" cy="0"/>
+          <a:chOff x="0" y="0"/>
+          <a:chExt cx="0" cy="0"/>
+        </a:xfrm>
+      </p:grpSpPr>
+      <p:sp>
+        <p:nvSpPr>
+          <p:cNvPr id="14338" name="Rectangle 2"/>
+          <p:cNvSpPr>
+            <a:spLocks noGrp="1" noChangeArrowheads="1"/>
+          </p:cNvSpPr>
+          <p:nvPr>
+            <p:ph type="title"/>
+          </p:nvPr>
+        </p:nvSpPr>
+        <p:spPr/>
+        <p:txBody>
+          <a:bodyPr/>
+          <a:lstStyle/>
+          <a:p>
+            <a:r>
+              <a:rPr lang="en-US" altLang="en-US" dirty="0"/>
+              <a:t>Detector in Intel </a:t>
+            </a:r>
+            <a:r>
+              <a:rPr lang="en-US" altLang="en-US" dirty="0" err="1" smtClean="0"/>
+              <a:t>OpenCV</a:t>
+            </a:r>
+            <a:endParaRPr lang="en-US" altLang="en-US" dirty="0"/>
+          </a:p>
+        </p:txBody>
+      </p:sp>
+      <p:sp>
+        <p:nvSpPr>
+          <p:cNvPr id="14339" name="Rectangle 3"/>
+          <p:cNvSpPr>
+            <a:spLocks noGrp="1" noChangeArrowheads="1"/>
+          </p:cNvSpPr>
+          <p:nvPr>
+            <p:ph type="body" idx="1"/>
+          </p:nvPr>
+        </p:nvSpPr>
+        <p:spPr/>
+        <p:txBody>
+          <a:bodyPr/>
+          <a:lstStyle/>
+          <a:p>
+            <a:pPr marL="609600" indent="-609600">
+              <a:buFontTx/>
+              <a:buAutoNum type="arabicPeriod"/>
+            </a:pPr>
+            <a:r>
+              <a:rPr lang="en-US" altLang="en-US" dirty="0"/>
+              <a:t>Collect a database of positive samples and a database of negative samples. </a:t>
+            </a:r>
+          </a:p>
+          <a:p>
+            <a:pPr marL="609600" indent="-609600">
+              <a:buFontTx/>
+              <a:buAutoNum type="arabicPeriod"/>
+            </a:pPr>
+            <a:r>
+              <a:rPr lang="en-US" altLang="en-US" dirty="0"/>
+              <a:t>Mark object by objectmarker.exe</a:t>
+            </a:r>
+          </a:p>
+          <a:p>
+            <a:pPr marL="609600" indent="-609600">
+              <a:buFontTx/>
+              <a:buAutoNum type="arabicPeriod"/>
+            </a:pPr>
+            <a:r>
+              <a:rPr lang="en-US" altLang="en-US" dirty="0"/>
+              <a:t>Build a </a:t>
+            </a:r>
+            <a:r>
+              <a:rPr lang="en-US" altLang="en-US" dirty="0" err="1"/>
+              <a:t>vec</a:t>
+            </a:r>
+            <a:r>
+              <a:rPr lang="en-US" altLang="en-US" dirty="0"/>
+              <a:t> file out of positive samples  using createsamples.exe</a:t>
+            </a:r>
+          </a:p>
+          <a:p>
+            <a:pPr marL="609600" indent="-609600">
+              <a:buFontTx/>
+              <a:buAutoNum type="arabicPeriod"/>
+            </a:pPr>
+            <a:r>
+              <a:rPr lang="en-US" altLang="en-US" dirty="0"/>
+              <a:t>Run haartraining.exe to build the classifier.</a:t>
+            </a:r>
+          </a:p>
+          <a:p>
+            <a:pPr marL="609600" indent="-609600">
+              <a:buFontTx/>
+              <a:buAutoNum type="arabicPeriod"/>
+            </a:pPr>
+            <a:r>
+              <a:rPr lang="en-US" altLang="en-US" dirty="0"/>
+              <a:t>Run performance.exe to evaluate the classifier.</a:t>
+            </a:r>
+          </a:p>
+          <a:p>
+            <a:pPr marL="609600" indent="-609600">
+              <a:buFontTx/>
+              <a:buAutoNum type="arabicPeriod"/>
+            </a:pPr>
+            <a:r>
+              <a:rPr lang="en-US" altLang="en-US" dirty="0"/>
+              <a:t>Run haarconv.exe to convert classifier to .xml file </a:t>
+            </a:r>
+          </a:p>
+        </p:txBody>
+      </p:sp>
+    </p:spTree>
+    <p:extLst>
+      <p:ext uri="{BB962C8B-B14F-4D97-AF65-F5344CB8AC3E}">
+        <p14:creationId xmlns:p14="http://schemas.microsoft.com/office/powerpoint/2010/main" val="472625032"/>
+      </p:ext>
+    </p:extLst>
+  </p:cSld>
+  <p:clrMapOvr>
+    <a:masterClrMapping/>
+  </p:clrMapOvr>
+  <p:timing>
+    <p:tnLst>
+      <p:par>
+        <p:cTn id="1" dur="indefinite" restart="never" nodeType="tmRoot"/>
+      </p:par>
+    </p:tnLst>
+  </p:timing>
+</p:sld>
+</file>
+
+<file path=ppt/slides/slide18.xml><?xml version="1.0" encoding="utf-8"?>
+<p:sld xmlns:a="http://schemas.openxmlformats.org/drawingml/2006/main" xmlns:r="http://schemas.openxmlformats.org/officeDocument/2006/relationships" xmlns:p="http://schemas.openxmlformats.org/presentationml/2006/main">
+  <p:cSld>
+    <p:spTree>
+      <p:nvGrpSpPr>
+        <p:cNvPr id="1" name=""/>
+        <p:cNvGrpSpPr/>
+        <p:nvPr/>
+      </p:nvGrpSpPr>
+      <p:grpSpPr>
+        <a:xfrm>
+          <a:off x="0" y="0"/>
+          <a:ext cx="0" cy="0"/>
+          <a:chOff x="0" y="0"/>
+          <a:chExt cx="0" cy="0"/>
+        </a:xfrm>
+      </p:grpSpPr>
       <p:sp>
         <p:nvSpPr>
           <p:cNvPr id="2" name="Title 1"/>
@@ -3427,7 +3961,12 @@
             <p:ph type="title"/>
           </p:nvPr>
         </p:nvSpPr>
-        <p:spPr/>
+        <p:spPr>
+          <a:xfrm>
+            <a:off x="838200" y="491490"/>
+            <a:ext cx="10515600" cy="1074420"/>
+          </a:xfrm>
+        </p:spPr>
         <p:txBody>
           <a:bodyPr/>
           <a:lstStyle/>
@@ -3520,10 +4059,9 @@
               <a:t>OpenCV</a:t>
             </a:r>
             <a:r>
-              <a:rPr lang="en-US" smtClean="0"/>
+              <a:rPr lang="en-US" dirty="0" smtClean="0"/>
               <a:t> detector;</a:t>
             </a:r>
-            <a:endParaRPr lang="en-US" dirty="0" smtClean="0"/>
           </a:p>
           <a:p>
             <a:endParaRPr lang="en-US" dirty="0"/>
@@ -4735,7 +5273,7 @@
           <a:graphicData uri="http://schemas.openxmlformats.org/presentationml/2006/ole">
             <mc:AlternateContent xmlns:mc="http://schemas.openxmlformats.org/markup-compatibility/2006">
               <mc:Choice xmlns:v="urn:schemas-microsoft-com:vml" Requires="v">
-                <p:oleObj spid="_x0000_s1040" name="Equation" r:id="rId4" imgW="1841400" imgH="241200" progId="Equation.3">
+                <p:oleObj spid="_x0000_s1050" name="Equation" r:id="rId4" imgW="1841400" imgH="241200" progId="Equation.3">
                   <p:embed/>
                 </p:oleObj>
               </mc:Choice>
@@ -4828,7 +5366,7 @@
           <a:graphicData uri="http://schemas.openxmlformats.org/presentationml/2006/ole">
             <mc:AlternateContent xmlns:mc="http://schemas.openxmlformats.org/markup-compatibility/2006">
               <mc:Choice xmlns:v="urn:schemas-microsoft-com:vml" Requires="v">
-                <p:oleObj spid="_x0000_s1041" name="Equation" r:id="rId6" imgW="1879560" imgH="482400" progId="Equation.3">
+                <p:oleObj spid="_x0000_s1051" name="Equation" r:id="rId6" imgW="1879560" imgH="482400" progId="Equation.3">
                   <p:embed/>
                 </p:oleObj>
               </mc:Choice>
@@ -4982,7 +5520,7 @@
           <a:graphicData uri="http://schemas.openxmlformats.org/presentationml/2006/ole">
             <mc:AlternateContent xmlns:mc="http://schemas.openxmlformats.org/markup-compatibility/2006">
               <mc:Choice xmlns:v="urn:schemas-microsoft-com:vml" Requires="v">
-                <p:oleObj spid="_x0000_s2064" name="Equation" r:id="rId3" imgW="2006280" imgH="228600" progId="Equation.3">
+                <p:oleObj spid="_x0000_s2074" name="Equation" r:id="rId3" imgW="2006280" imgH="228600" progId="Equation.3">
                   <p:embed/>
                 </p:oleObj>
               </mc:Choice>
@@ -5077,7 +5615,7 @@
           <a:graphicData uri="http://schemas.openxmlformats.org/presentationml/2006/ole">
             <mc:AlternateContent xmlns:mc="http://schemas.openxmlformats.org/markup-compatibility/2006">
               <mc:Choice xmlns:v="urn:schemas-microsoft-com:vml" Requires="v">
-                <p:oleObj spid="_x0000_s2065" name="Equation" r:id="rId5" imgW="1892160" imgH="482400" progId="Equation.3">
+                <p:oleObj spid="_x0000_s2075" name="Equation" r:id="rId5" imgW="1892160" imgH="482400" progId="Equation.3">
                   <p:embed/>
                 </p:oleObj>
               </mc:Choice>
@@ -5257,134 +5795,40 @@
           <a:chExt cx="0" cy="0"/>
         </a:xfrm>
       </p:grpSpPr>
-      <p:sp>
-        <p:nvSpPr>
-          <p:cNvPr id="14338" name="Rectangle 2"/>
-          <p:cNvSpPr>
-            <a:spLocks noGrp="1" noChangeArrowheads="1"/>
-          </p:cNvSpPr>
-          <p:nvPr>
-            <p:ph type="title"/>
-          </p:nvPr>
-        </p:nvSpPr>
-        <p:spPr/>
-        <p:txBody>
-          <a:bodyPr/>
-          <a:lstStyle/>
-          <a:p>
-            <a:r>
-              <a:rPr lang="en-US" altLang="en-US" dirty="0"/>
-              <a:t>Detector in Intel </a:t>
-            </a:r>
-            <a:r>
-              <a:rPr lang="en-US" altLang="en-US" dirty="0" err="1" smtClean="0"/>
-              <a:t>OpenCV</a:t>
-            </a:r>
-            <a:endParaRPr lang="en-US" altLang="en-US" dirty="0"/>
-          </a:p>
-        </p:txBody>
-      </p:sp>
-      <p:sp>
-        <p:nvSpPr>
-          <p:cNvPr id="14339" name="Rectangle 3"/>
-          <p:cNvSpPr>
-            <a:spLocks noGrp="1" noChangeArrowheads="1"/>
-          </p:cNvSpPr>
-          <p:nvPr>
-            <p:ph type="body" idx="1"/>
-          </p:nvPr>
-        </p:nvSpPr>
-        <p:spPr/>
-        <p:txBody>
-          <a:bodyPr/>
-          <a:lstStyle/>
-          <a:p>
-            <a:pPr marL="609600" indent="-609600">
-              <a:buFontTx/>
-              <a:buAutoNum type="arabicPeriod"/>
-            </a:pPr>
-            <a:r>
-              <a:rPr lang="en-US" altLang="en-US" dirty="0"/>
-              <a:t>Collect a database of positive samples and a database of negative samples. </a:t>
-            </a:r>
-          </a:p>
-          <a:p>
-            <a:pPr marL="609600" indent="-609600">
-              <a:buFontTx/>
-              <a:buAutoNum type="arabicPeriod"/>
-            </a:pPr>
-            <a:r>
-              <a:rPr lang="en-US" altLang="en-US" dirty="0"/>
-              <a:t>Mark object by objectmarker.exe</a:t>
-            </a:r>
-          </a:p>
-          <a:p>
-            <a:pPr marL="609600" indent="-609600">
-              <a:buFontTx/>
-              <a:buAutoNum type="arabicPeriod"/>
-            </a:pPr>
-            <a:r>
-              <a:rPr lang="en-US" altLang="en-US" dirty="0"/>
-              <a:t>Build a </a:t>
-            </a:r>
-            <a:r>
-              <a:rPr lang="en-US" altLang="en-US" dirty="0" err="1"/>
-              <a:t>vec</a:t>
-            </a:r>
-            <a:r>
-              <a:rPr lang="en-US" altLang="en-US" dirty="0"/>
-              <a:t> file out of positive samples  using createsamples.exe</a:t>
-            </a:r>
-          </a:p>
-          <a:p>
-            <a:pPr marL="609600" indent="-609600">
-              <a:buFontTx/>
-              <a:buAutoNum type="arabicPeriod"/>
-            </a:pPr>
-            <a:r>
-              <a:rPr lang="en-US" altLang="en-US" dirty="0"/>
-              <a:t>Run haartraining.exe to build the classifier.</a:t>
-            </a:r>
-          </a:p>
-          <a:p>
-            <a:pPr marL="609600" indent="-609600">
-              <a:buFontTx/>
-              <a:buAutoNum type="arabicPeriod"/>
-            </a:pPr>
-            <a:r>
-              <a:rPr lang="en-US" altLang="en-US" dirty="0"/>
-              <a:t>Run performance.exe to evaluate the classifier.</a:t>
-            </a:r>
-          </a:p>
-          <a:p>
-            <a:pPr marL="609600" indent="-609600">
-              <a:buFontTx/>
-              <a:buAutoNum type="arabicPeriod"/>
-            </a:pPr>
-            <a:r>
-              <a:rPr lang="en-US" altLang="en-US" dirty="0"/>
-              <a:t>Run haarconv.exe to convert classifier to .xml file </a:t>
-            </a:r>
-          </a:p>
-        </p:txBody>
-      </p:sp>
+      <p:pic>
+        <p:nvPicPr>
+          <p:cNvPr id="2" name="Picture 1"/>
+          <p:cNvPicPr>
+            <a:picLocks noChangeAspect="1"/>
+          </p:cNvPicPr>
+          <p:nvPr/>
+        </p:nvPicPr>
+        <p:blipFill>
+          <a:blip r:embed="rId2"/>
+          <a:stretch>
+            <a:fillRect/>
+          </a:stretch>
+        </p:blipFill>
+        <p:spPr>
+          <a:xfrm>
+            <a:off x="94325" y="844953"/>
+            <a:ext cx="11827082" cy="5825761"/>
+          </a:xfrm>
+          <a:prstGeom prst="rect">
+            <a:avLst/>
+          </a:prstGeom>
+        </p:spPr>
+      </p:pic>
     </p:spTree>
     <p:extLst>
       <p:ext uri="{BB962C8B-B14F-4D97-AF65-F5344CB8AC3E}">
-        <p14:creationId xmlns:p14="http://schemas.microsoft.com/office/powerpoint/2010/main" val="472625032"/>
+        <p14:creationId xmlns:p14="http://schemas.microsoft.com/office/powerpoint/2010/main" val="2306860150"/>
       </p:ext>
     </p:extLst>
   </p:cSld>
   <p:clrMapOvr>
     <a:masterClrMapping/>
   </p:clrMapOvr>
-  <p:timing>
-    <p:tnLst>
-      <p:par>
-        <p:cTn id="1" dur="indefinite" restart="never" nodeType="tmRoot"/>
-      </p:par>
-    </p:tnLst>
-  </p:timing>
 </p:sld>
 </file>
 

</xml_diff>